<commit_message>
BAD vs Discard Files
</commit_message>
<xml_diff>
--- a/SQLLDR/Bad_Vs_Discard.pptx
+++ b/SQLLDR/Bad_Vs_Discard.pptx
@@ -18,7 +18,8 @@
     <p:sldId id="265" r:id="rId12"/>
     <p:sldId id="267" r:id="rId13"/>
     <p:sldId id="268" r:id="rId14"/>
-    <p:sldId id="269" r:id="rId15"/>
+    <p:sldId id="270" r:id="rId15"/>
+    <p:sldId id="269" r:id="rId16"/>
   </p:sldIdLst>
   <p:sldSz cx="9144000" cy="6858000" type="screen4x3"/>
   <p:notesSz cx="6858000" cy="9144000"/>
@@ -301,7 +302,7 @@
           <a:p>
             <a:fld id="{E30B6D15-E501-4B30-9258-F6AF2DAF638F}" type="datetimeFigureOut">
               <a:rPr lang="en-US" smtClean="0"/>
-              <a:t>2/25/2015</a:t>
+              <a:t>2/26/2015</a:t>
             </a:fld>
             <a:endParaRPr lang="en-US"/>
           </a:p>
@@ -471,7 +472,7 @@
           <a:p>
             <a:fld id="{E30B6D15-E501-4B30-9258-F6AF2DAF638F}" type="datetimeFigureOut">
               <a:rPr lang="en-US" smtClean="0"/>
-              <a:t>2/25/2015</a:t>
+              <a:t>2/26/2015</a:t>
             </a:fld>
             <a:endParaRPr lang="en-US"/>
           </a:p>
@@ -651,7 +652,7 @@
           <a:p>
             <a:fld id="{E30B6D15-E501-4B30-9258-F6AF2DAF638F}" type="datetimeFigureOut">
               <a:rPr lang="en-US" smtClean="0"/>
-              <a:t>2/25/2015</a:t>
+              <a:t>2/26/2015</a:t>
             </a:fld>
             <a:endParaRPr lang="en-US"/>
           </a:p>
@@ -821,7 +822,7 @@
           <a:p>
             <a:fld id="{E30B6D15-E501-4B30-9258-F6AF2DAF638F}" type="datetimeFigureOut">
               <a:rPr lang="en-US" smtClean="0"/>
-              <a:t>2/25/2015</a:t>
+              <a:t>2/26/2015</a:t>
             </a:fld>
             <a:endParaRPr lang="en-US"/>
           </a:p>
@@ -1067,7 +1068,7 @@
           <a:p>
             <a:fld id="{E30B6D15-E501-4B30-9258-F6AF2DAF638F}" type="datetimeFigureOut">
               <a:rPr lang="en-US" smtClean="0"/>
-              <a:t>2/25/2015</a:t>
+              <a:t>2/26/2015</a:t>
             </a:fld>
             <a:endParaRPr lang="en-US"/>
           </a:p>
@@ -1355,7 +1356,7 @@
           <a:p>
             <a:fld id="{E30B6D15-E501-4B30-9258-F6AF2DAF638F}" type="datetimeFigureOut">
               <a:rPr lang="en-US" smtClean="0"/>
-              <a:t>2/25/2015</a:t>
+              <a:t>2/26/2015</a:t>
             </a:fld>
             <a:endParaRPr lang="en-US"/>
           </a:p>
@@ -1777,7 +1778,7 @@
           <a:p>
             <a:fld id="{E30B6D15-E501-4B30-9258-F6AF2DAF638F}" type="datetimeFigureOut">
               <a:rPr lang="en-US" smtClean="0"/>
-              <a:t>2/25/2015</a:t>
+              <a:t>2/26/2015</a:t>
             </a:fld>
             <a:endParaRPr lang="en-US"/>
           </a:p>
@@ -1895,7 +1896,7 @@
           <a:p>
             <a:fld id="{E30B6D15-E501-4B30-9258-F6AF2DAF638F}" type="datetimeFigureOut">
               <a:rPr lang="en-US" smtClean="0"/>
-              <a:t>2/25/2015</a:t>
+              <a:t>2/26/2015</a:t>
             </a:fld>
             <a:endParaRPr lang="en-US"/>
           </a:p>
@@ -1990,7 +1991,7 @@
           <a:p>
             <a:fld id="{E30B6D15-E501-4B30-9258-F6AF2DAF638F}" type="datetimeFigureOut">
               <a:rPr lang="en-US" smtClean="0"/>
-              <a:t>2/25/2015</a:t>
+              <a:t>2/26/2015</a:t>
             </a:fld>
             <a:endParaRPr lang="en-US"/>
           </a:p>
@@ -2267,7 +2268,7 @@
           <a:p>
             <a:fld id="{E30B6D15-E501-4B30-9258-F6AF2DAF638F}" type="datetimeFigureOut">
               <a:rPr lang="en-US" smtClean="0"/>
-              <a:t>2/25/2015</a:t>
+              <a:t>2/26/2015</a:t>
             </a:fld>
             <a:endParaRPr lang="en-US"/>
           </a:p>
@@ -2520,7 +2521,7 @@
           <a:p>
             <a:fld id="{E30B6D15-E501-4B30-9258-F6AF2DAF638F}" type="datetimeFigureOut">
               <a:rPr lang="en-US" smtClean="0"/>
-              <a:t>2/25/2015</a:t>
+              <a:t>2/26/2015</a:t>
             </a:fld>
             <a:endParaRPr lang="en-US"/>
           </a:p>
@@ -2733,7 +2734,7 @@
           <a:p>
             <a:fld id="{E30B6D15-E501-4B30-9258-F6AF2DAF638F}" type="datetimeFigureOut">
               <a:rPr lang="en-US" smtClean="0"/>
-              <a:t>2/25/2015</a:t>
+              <a:t>2/26/2015</a:t>
             </a:fld>
             <a:endParaRPr lang="en-US"/>
           </a:p>
@@ -3192,6 +3193,13 @@
   <p:clrMapOvr>
     <a:masterClrMapping/>
   </p:clrMapOvr>
+  <p:timing>
+    <p:tnLst>
+      <p:par>
+        <p:cTn id="1" dur="indefinite" restart="never" nodeType="tmRoot"/>
+      </p:par>
+    </p:tnLst>
+  </p:timing>
 </p:sld>
 </file>
 
@@ -3438,6 +3446,13 @@
   <p:clrMapOvr>
     <a:masterClrMapping/>
   </p:clrMapOvr>
+  <p:timing>
+    <p:tnLst>
+      <p:par>
+        <p:cTn id="1" dur="indefinite" restart="never" nodeType="tmRoot"/>
+      </p:par>
+    </p:tnLst>
+  </p:timing>
 </p:sld>
 </file>
 
@@ -3498,7 +3513,7 @@
           <a:p>
             <a:r>
               <a:rPr lang="en-US" dirty="0" smtClean="0"/>
-              <a:t>Noticed that record 1,2,and 5 were discarded</a:t>
+              <a:t>Notice that record 1,2,and 5 were discarded</a:t>
             </a:r>
           </a:p>
           <a:p>
@@ -3537,6 +3552,13 @@
   <p:clrMapOvr>
     <a:masterClrMapping/>
   </p:clrMapOvr>
+  <p:timing>
+    <p:tnLst>
+      <p:par>
+        <p:cTn id="1" dur="indefinite" restart="never" nodeType="tmRoot"/>
+      </p:par>
+    </p:tnLst>
+  </p:timing>
 </p:sld>
 </file>
 
@@ -3628,6 +3650,13 @@
   <p:clrMapOvr>
     <a:masterClrMapping/>
   </p:clrMapOvr>
+  <p:timing>
+    <p:tnLst>
+      <p:par>
+        <p:cTn id="1" dur="indefinite" restart="never" nodeType="tmRoot"/>
+      </p:par>
+    </p:tnLst>
+  </p:timing>
 </p:sld>
 </file>
 
@@ -3730,6 +3759,13 @@
   <p:clrMapOvr>
     <a:masterClrMapping/>
   </p:clrMapOvr>
+  <p:timing>
+    <p:tnLst>
+      <p:par>
+        <p:cTn id="1" dur="indefinite" restart="never" nodeType="tmRoot"/>
+      </p:par>
+    </p:tnLst>
+  </p:timing>
 </p:sld>
 </file>
 
@@ -3767,6 +3803,153 @@
           <a:p>
             <a:r>
               <a:rPr lang="en-US" dirty="0" smtClean="0"/>
+              <a:t>EMP2 Table</a:t>
+            </a:r>
+            <a:endParaRPr lang="en-US" dirty="0"/>
+          </a:p>
+        </p:txBody>
+      </p:sp>
+      <p:sp>
+        <p:nvSpPr>
+          <p:cNvPr id="3" name="Content Placeholder 2"/>
+          <p:cNvSpPr>
+            <a:spLocks noGrp="1"/>
+          </p:cNvSpPr>
+          <p:nvPr>
+            <p:ph idx="1"/>
+          </p:nvPr>
+        </p:nvSpPr>
+        <p:spPr/>
+        <p:txBody>
+          <a:bodyPr>
+            <a:normAutofit fontScale="92500" lnSpcReduction="20000"/>
+          </a:bodyPr>
+          <a:lstStyle/>
+          <a:p>
+            <a:endParaRPr lang="en-US" dirty="0"/>
+          </a:p>
+          <a:p>
+            <a:pPr marL="0" indent="0">
+              <a:buNone/>
+            </a:pPr>
+            <a:r>
+              <a:rPr lang="en-US" dirty="0"/>
+              <a:t>SQL&gt; select * from emp2;</a:t>
+            </a:r>
+          </a:p>
+          <a:p>
+            <a:endParaRPr lang="en-US" dirty="0"/>
+          </a:p>
+          <a:p>
+            <a:pPr marL="0" indent="0">
+              <a:buNone/>
+            </a:pPr>
+            <a:r>
+              <a:rPr lang="en-US" dirty="0"/>
+              <a:t>EMPLOYEE_ID FIRST_NAME           LAST_NAME</a:t>
+            </a:r>
+          </a:p>
+          <a:p>
+            <a:pPr marL="0" indent="0">
+              <a:buNone/>
+            </a:pPr>
+            <a:r>
+              <a:rPr lang="en-US" dirty="0"/>
+              <a:t>----------- -------------------- -------------</a:t>
+            </a:r>
+          </a:p>
+          <a:p>
+            <a:pPr marL="0" indent="0">
+              <a:buNone/>
+            </a:pPr>
+            <a:r>
+              <a:rPr lang="en-US" dirty="0"/>
+              <a:t>        777 John                 Smith</a:t>
+            </a:r>
+          </a:p>
+          <a:p>
+            <a:pPr marL="0" indent="0">
+              <a:buNone/>
+            </a:pPr>
+            <a:r>
+              <a:rPr lang="en-US" dirty="0"/>
+              <a:t>        100 John                 West</a:t>
+            </a:r>
+          </a:p>
+          <a:p>
+            <a:pPr marL="0" indent="0">
+              <a:buNone/>
+            </a:pPr>
+            <a:r>
+              <a:rPr lang="en-US" dirty="0"/>
+              <a:t>        200 Kim                  Lee</a:t>
+            </a:r>
+          </a:p>
+          <a:p>
+            <a:pPr marL="0" indent="0">
+              <a:buNone/>
+            </a:pPr>
+            <a:r>
+              <a:rPr lang="en-US" dirty="0"/>
+              <a:t>        300 Alice                Green</a:t>
+            </a:r>
+          </a:p>
+        </p:txBody>
+      </p:sp>
+    </p:spTree>
+    <p:extLst>
+      <p:ext uri="{BB962C8B-B14F-4D97-AF65-F5344CB8AC3E}">
+        <p14:creationId xmlns:p14="http://schemas.microsoft.com/office/powerpoint/2010/main" val="3853646923"/>
+      </p:ext>
+    </p:extLst>
+  </p:cSld>
+  <p:clrMapOvr>
+    <a:masterClrMapping/>
+  </p:clrMapOvr>
+  <p:timing>
+    <p:tnLst>
+      <p:par>
+        <p:cTn id="1" dur="indefinite" restart="never" nodeType="tmRoot"/>
+      </p:par>
+    </p:tnLst>
+  </p:timing>
+</p:sld>
+</file>
+
+<file path=ppt/slides/slide15.xml><?xml version="1.0" encoding="utf-8"?>
+<p:sld xmlns:a="http://schemas.openxmlformats.org/drawingml/2006/main" xmlns:r="http://schemas.openxmlformats.org/officeDocument/2006/relationships" xmlns:p="http://schemas.openxmlformats.org/presentationml/2006/main">
+  <p:cSld>
+    <p:spTree>
+      <p:nvGrpSpPr>
+        <p:cNvPr id="1" name=""/>
+        <p:cNvGrpSpPr/>
+        <p:nvPr/>
+      </p:nvGrpSpPr>
+      <p:grpSpPr>
+        <a:xfrm>
+          <a:off x="0" y="0"/>
+          <a:ext cx="0" cy="0"/>
+          <a:chOff x="0" y="0"/>
+          <a:chExt cx="0" cy="0"/>
+        </a:xfrm>
+      </p:grpSpPr>
+      <p:sp>
+        <p:nvSpPr>
+          <p:cNvPr id="2" name="Title 1"/>
+          <p:cNvSpPr>
+            <a:spLocks noGrp="1"/>
+          </p:cNvSpPr>
+          <p:nvPr>
+            <p:ph type="title"/>
+          </p:nvPr>
+        </p:nvSpPr>
+        <p:spPr/>
+        <p:txBody>
+          <a:bodyPr/>
+          <a:lstStyle/>
+          <a:p>
+            <a:r>
+              <a:rPr lang="en-US" dirty="0" smtClean="0"/>
               <a:t>Comments</a:t>
             </a:r>
             <a:endParaRPr lang="en-US" dirty="0"/>
@@ -3852,6 +4035,13 @@
   <p:clrMapOvr>
     <a:masterClrMapping/>
   </p:clrMapOvr>
+  <p:timing>
+    <p:tnLst>
+      <p:par>
+        <p:cTn id="1" dur="indefinite" restart="never" nodeType="tmRoot"/>
+      </p:par>
+    </p:tnLst>
+  </p:timing>
 </p:sld>
 </file>
 
@@ -3994,6 +4184,13 @@
   <p:clrMapOvr>
     <a:masterClrMapping/>
   </p:clrMapOvr>
+  <p:timing>
+    <p:tnLst>
+      <p:par>
+        <p:cTn id="1" dur="indefinite" restart="never" nodeType="tmRoot"/>
+      </p:par>
+    </p:tnLst>
+  </p:timing>
 </p:sld>
 </file>
 
@@ -4093,6 +4290,13 @@
   <p:clrMapOvr>
     <a:masterClrMapping/>
   </p:clrMapOvr>
+  <p:timing>
+    <p:tnLst>
+      <p:par>
+        <p:cTn id="1" dur="indefinite" restart="never" nodeType="tmRoot"/>
+      </p:par>
+    </p:tnLst>
+  </p:timing>
 </p:sld>
 </file>
 
@@ -4273,6 +4477,13 @@
   <p:clrMapOvr>
     <a:masterClrMapping/>
   </p:clrMapOvr>
+  <p:timing>
+    <p:tnLst>
+      <p:par>
+        <p:cTn id="1" dur="indefinite" restart="never" nodeType="tmRoot"/>
+      </p:par>
+    </p:tnLst>
+  </p:timing>
 </p:sld>
 </file>
 
@@ -4422,6 +4633,13 @@
   <p:clrMapOvr>
     <a:masterClrMapping/>
   </p:clrMapOvr>
+  <p:timing>
+    <p:tnLst>
+      <p:par>
+        <p:cTn id="1" dur="indefinite" restart="never" nodeType="tmRoot"/>
+      </p:par>
+    </p:tnLst>
+  </p:timing>
 </p:sld>
 </file>
 
@@ -4505,7 +4723,7 @@
             </a:pPr>
             <a:r>
               <a:rPr lang="en-US" dirty="0" smtClean="0"/>
-              <a:t>The discard records are good records but they did not meet the condition of name “John”.  There is nothing wrong with the records, we just disregarded them.  </a:t>
+              <a:t>The discard records are good records but they did not meet the condition of name “John”.  There is nothing wrong with the records, we just disregard them.  </a:t>
             </a:r>
             <a:endParaRPr lang="en-US" dirty="0"/>
           </a:p>
@@ -4521,6 +4739,13 @@
   <p:clrMapOvr>
     <a:masterClrMapping/>
   </p:clrMapOvr>
+  <p:timing>
+    <p:tnLst>
+      <p:par>
+        <p:cTn id="1" dur="indefinite" restart="never" nodeType="tmRoot"/>
+      </p:par>
+    </p:tnLst>
+  </p:timing>
 </p:sld>
 </file>
 
@@ -4752,6 +4977,13 @@
   <p:clrMapOvr>
     <a:masterClrMapping/>
   </p:clrMapOvr>
+  <p:timing>
+    <p:tnLst>
+      <p:par>
+        <p:cTn id="1" dur="indefinite" restart="never" nodeType="tmRoot"/>
+      </p:par>
+    </p:tnLst>
+  </p:timing>
 </p:sld>
 </file>
 
@@ -4872,6 +5104,13 @@
   <p:clrMapOvr>
     <a:masterClrMapping/>
   </p:clrMapOvr>
+  <p:timing>
+    <p:tnLst>
+      <p:par>
+        <p:cTn id="1" dur="indefinite" restart="never" nodeType="tmRoot"/>
+      </p:par>
+    </p:tnLst>
+  </p:timing>
 </p:sld>
 </file>
 
@@ -5088,6 +5327,13 @@
   <p:clrMapOvr>
     <a:masterClrMapping/>
   </p:clrMapOvr>
+  <p:timing>
+    <p:tnLst>
+      <p:par>
+        <p:cTn id="1" dur="indefinite" restart="never" nodeType="tmRoot"/>
+      </p:par>
+    </p:tnLst>
+  </p:timing>
 </p:sld>
 </file>
 

</xml_diff>